<commit_message>
atualização slides de aulas 14Set2023
</commit_message>
<xml_diff>
--- a/01 Classes/Aula 06 Desenvolvimento Web PHP - CSS.pptx
+++ b/01 Classes/Aula 06 Desenvolvimento Web PHP - CSS.pptx
@@ -7065,7 +7065,7 @@
             <a:r>
               <a:rPr lang="pt-BR" b="1" dirty="0" err="1">
                 <a:solidFill>
-                  <a:schemeClr val="tx1"/>
+                  <a:srgbClr val="FF0000"/>
                 </a:solidFill>
                 <a:latin typeface="Times New Roman" panose="02020603050405020304" pitchFamily="18" charset="0"/>
                 <a:cs typeface="Times New Roman" panose="02020603050405020304" pitchFamily="18" charset="0"/>
@@ -10144,12 +10144,22 @@
             <a:r>
               <a:rPr lang="pt-BR" b="1" dirty="0">
                 <a:solidFill>
-                  <a:schemeClr val="tx1"/>
-                </a:solidFill>
-                <a:latin typeface="Times New Roman" panose="02020603050405020304" pitchFamily="18" charset="0"/>
-                <a:cs typeface="Times New Roman" panose="02020603050405020304" pitchFamily="18" charset="0"/>
-              </a:rPr>
-              <a:t>display: </a:t>
+                  <a:srgbClr val="FF0000"/>
+                </a:solidFill>
+                <a:latin typeface="Times New Roman" panose="02020603050405020304" pitchFamily="18" charset="0"/>
+                <a:cs typeface="Times New Roman" panose="02020603050405020304" pitchFamily="18" charset="0"/>
+              </a:rPr>
+              <a:t>display</a:t>
+            </a:r>
+            <a:r>
+              <a:rPr lang="pt-BR" b="1" dirty="0">
+                <a:solidFill>
+                  <a:schemeClr val="tx1"/>
+                </a:solidFill>
+                <a:latin typeface="Times New Roman" panose="02020603050405020304" pitchFamily="18" charset="0"/>
+                <a:cs typeface="Times New Roman" panose="02020603050405020304" pitchFamily="18" charset="0"/>
+              </a:rPr>
+              <a:t>: </a:t>
             </a:r>
             <a:r>
               <a:rPr lang="pt-BR" b="1" dirty="0" err="1">
@@ -10174,7 +10184,7 @@
             <a:r>
               <a:rPr lang="pt-BR" b="1" dirty="0" err="1">
                 <a:solidFill>
-                  <a:schemeClr val="tx1"/>
+                  <a:srgbClr val="FF0000"/>
                 </a:solidFill>
                 <a:latin typeface="Times New Roman" panose="02020603050405020304" pitchFamily="18" charset="0"/>
                 <a:cs typeface="Times New Roman" panose="02020603050405020304" pitchFamily="18" charset="0"/>
@@ -10241,7 +10251,7 @@
             <a:r>
               <a:rPr lang="pt-BR" b="1" dirty="0" err="1">
                 <a:solidFill>
-                  <a:schemeClr val="tx1"/>
+                  <a:srgbClr val="FF0000"/>
                 </a:solidFill>
                 <a:latin typeface="Times New Roman" panose="02020603050405020304" pitchFamily="18" charset="0"/>
                 <a:cs typeface="Times New Roman" panose="02020603050405020304" pitchFamily="18" charset="0"/>
@@ -10390,12 +10400,22 @@
             <a:r>
               <a:rPr lang="pt-BR" b="1" dirty="0">
                 <a:solidFill>
-                  <a:schemeClr val="tx1"/>
-                </a:solidFill>
-                <a:latin typeface="Times New Roman" panose="02020603050405020304" pitchFamily="18" charset="0"/>
-                <a:cs typeface="Times New Roman" panose="02020603050405020304" pitchFamily="18" charset="0"/>
-              </a:rPr>
-              <a:t>display: </a:t>
+                  <a:srgbClr val="FF0000"/>
+                </a:solidFill>
+                <a:latin typeface="Times New Roman" panose="02020603050405020304" pitchFamily="18" charset="0"/>
+                <a:cs typeface="Times New Roman" panose="02020603050405020304" pitchFamily="18" charset="0"/>
+              </a:rPr>
+              <a:t>display</a:t>
+            </a:r>
+            <a:r>
+              <a:rPr lang="pt-BR" b="1" dirty="0">
+                <a:solidFill>
+                  <a:schemeClr val="tx1"/>
+                </a:solidFill>
+                <a:latin typeface="Times New Roman" panose="02020603050405020304" pitchFamily="18" charset="0"/>
+                <a:cs typeface="Times New Roman" panose="02020603050405020304" pitchFamily="18" charset="0"/>
+              </a:rPr>
+              <a:t>: </a:t>
             </a:r>
             <a:r>
               <a:rPr lang="pt-BR" b="1" dirty="0" err="1">
@@ -10415,6 +10435,56 @@
                 <a:latin typeface="Times New Roman" panose="02020603050405020304" pitchFamily="18" charset="0"/>
                 <a:cs typeface="Times New Roman" panose="02020603050405020304" pitchFamily="18" charset="0"/>
               </a:rPr>
+              <a:t>, </a:t>
+            </a:r>
+            <a:r>
+              <a:rPr lang="pt-BR" dirty="0">
+                <a:solidFill>
+                  <a:schemeClr val="tx1"/>
+                </a:solidFill>
+                <a:latin typeface="Times New Roman" panose="02020603050405020304" pitchFamily="18" charset="0"/>
+                <a:cs typeface="Times New Roman" panose="02020603050405020304" pitchFamily="18" charset="0"/>
+              </a:rPr>
+              <a:t>mas agora temos a possibilidade de </a:t>
+            </a:r>
+            <a:r>
+              <a:rPr lang="pt-BR" b="1" dirty="0">
+                <a:solidFill>
+                  <a:srgbClr val="FF0000"/>
+                </a:solidFill>
+                <a:latin typeface="Times New Roman" panose="02020603050405020304" pitchFamily="18" charset="0"/>
+                <a:cs typeface="Times New Roman" panose="02020603050405020304" pitchFamily="18" charset="0"/>
+              </a:rPr>
+              <a:t>alinhar verticalmente</a:t>
+            </a:r>
+            <a:r>
+              <a:rPr lang="pt-BR" dirty="0">
+                <a:solidFill>
+                  <a:schemeClr val="tx1"/>
+                </a:solidFill>
+                <a:latin typeface="Times New Roman" panose="02020603050405020304" pitchFamily="18" charset="0"/>
+                <a:cs typeface="Times New Roman" panose="02020603050405020304" pitchFamily="18" charset="0"/>
+              </a:rPr>
+              <a:t>, utilizando </a:t>
+            </a:r>
+            <a:r>
+              <a:rPr lang="pt-BR" b="1" dirty="0" err="1">
+                <a:solidFill>
+                  <a:schemeClr val="tx1"/>
+                </a:solidFill>
+                <a:latin typeface="Times New Roman" panose="02020603050405020304" pitchFamily="18" charset="0"/>
+                <a:cs typeface="Times New Roman" panose="02020603050405020304" pitchFamily="18" charset="0"/>
+              </a:rPr>
+              <a:t>justify-content</a:t>
+            </a:r>
+            <a:r>
+              <a:rPr lang="pt-BR" b="1" dirty="0">
+                <a:solidFill>
+                  <a:schemeClr val="tx1"/>
+                </a:solidFill>
+                <a:latin typeface="Times New Roman" panose="02020603050405020304" pitchFamily="18" charset="0"/>
+                <a:cs typeface="Times New Roman" panose="02020603050405020304" pitchFamily="18" charset="0"/>
+              </a:rPr>
               <a:t> </a:t>
             </a:r>
             <a:r>
@@ -10425,7 +10495,27 @@
                 <a:latin typeface="Times New Roman" panose="02020603050405020304" pitchFamily="18" charset="0"/>
                 <a:cs typeface="Times New Roman" panose="02020603050405020304" pitchFamily="18" charset="0"/>
               </a:rPr>
-              <a:t>mas agora temos a possibilidade de alinhar verticalmente, utilizando </a:t>
+              <a:t>e </a:t>
+            </a:r>
+            <a:r>
+              <a:rPr lang="pt-BR" b="1" dirty="0">
+                <a:solidFill>
+                  <a:srgbClr val="0070C0"/>
+                </a:solidFill>
+                <a:latin typeface="Times New Roman" panose="02020603050405020304" pitchFamily="18" charset="0"/>
+                <a:cs typeface="Times New Roman" panose="02020603050405020304" pitchFamily="18" charset="0"/>
+              </a:rPr>
+              <a:t>horizontalmente utilizando</a:t>
+            </a:r>
+            <a:r>
+              <a:rPr lang="pt-BR" dirty="0">
+                <a:solidFill>
+                  <a:schemeClr val="tx1"/>
+                </a:solidFill>
+                <a:latin typeface="Times New Roman" panose="02020603050405020304" pitchFamily="18" charset="0"/>
+                <a:cs typeface="Times New Roman" panose="02020603050405020304" pitchFamily="18" charset="0"/>
+              </a:rPr>
+              <a:t> </a:t>
             </a:r>
             <a:r>
               <a:rPr lang="pt-BR" b="1" dirty="0" err="1">
@@ -10435,17 +10525,27 @@
                 <a:latin typeface="Times New Roman" panose="02020603050405020304" pitchFamily="18" charset="0"/>
                 <a:cs typeface="Times New Roman" panose="02020603050405020304" pitchFamily="18" charset="0"/>
               </a:rPr>
-              <a:t>justify-content</a:t>
+              <a:t>align-items</a:t>
+            </a:r>
+            <a:r>
+              <a:rPr lang="pt-BR" dirty="0">
+                <a:solidFill>
+                  <a:schemeClr val="tx1"/>
+                </a:solidFill>
+                <a:latin typeface="Times New Roman" panose="02020603050405020304" pitchFamily="18" charset="0"/>
+                <a:cs typeface="Times New Roman" panose="02020603050405020304" pitchFamily="18" charset="0"/>
+              </a:rPr>
+              <a:t> (os </a:t>
             </a:r>
             <a:r>
               <a:rPr lang="pt-BR" b="1" dirty="0">
                 <a:solidFill>
-                  <a:schemeClr val="tx1"/>
-                </a:solidFill>
-                <a:latin typeface="Times New Roman" panose="02020603050405020304" pitchFamily="18" charset="0"/>
-                <a:cs typeface="Times New Roman" panose="02020603050405020304" pitchFamily="18" charset="0"/>
-              </a:rPr>
-              <a:t> </a:t>
+                  <a:srgbClr val="FF0000"/>
+                </a:solidFill>
+                <a:latin typeface="Times New Roman" panose="02020603050405020304" pitchFamily="18" charset="0"/>
+                <a:cs typeface="Times New Roman" panose="02020603050405020304" pitchFamily="18" charset="0"/>
+              </a:rPr>
+              <a:t>eixos ficam invertidos </a:t>
             </a:r>
             <a:r>
               <a:rPr lang="pt-BR" dirty="0">
@@ -10455,52 +10555,12 @@
                 <a:latin typeface="Times New Roman" panose="02020603050405020304" pitchFamily="18" charset="0"/>
                 <a:cs typeface="Times New Roman" panose="02020603050405020304" pitchFamily="18" charset="0"/>
               </a:rPr>
-              <a:t>e horizontalmente utilizando </a:t>
+              <a:t>em comparação ao </a:t>
             </a:r>
             <a:r>
               <a:rPr lang="pt-BR" b="1" dirty="0" err="1">
                 <a:solidFill>
-                  <a:schemeClr val="tx1"/>
-                </a:solidFill>
-                <a:latin typeface="Times New Roman" panose="02020603050405020304" pitchFamily="18" charset="0"/>
-                <a:cs typeface="Times New Roman" panose="02020603050405020304" pitchFamily="18" charset="0"/>
-              </a:rPr>
-              <a:t>align-items</a:t>
-            </a:r>
-            <a:r>
-              <a:rPr lang="pt-BR" dirty="0">
-                <a:solidFill>
-                  <a:schemeClr val="tx1"/>
-                </a:solidFill>
-                <a:latin typeface="Times New Roman" panose="02020603050405020304" pitchFamily="18" charset="0"/>
-                <a:cs typeface="Times New Roman" panose="02020603050405020304" pitchFamily="18" charset="0"/>
-              </a:rPr>
-              <a:t> (os </a:t>
-            </a:r>
-            <a:r>
-              <a:rPr lang="pt-BR" b="1" dirty="0">
-                <a:solidFill>
                   <a:srgbClr val="FF0000"/>
-                </a:solidFill>
-                <a:latin typeface="Times New Roman" panose="02020603050405020304" pitchFamily="18" charset="0"/>
-                <a:cs typeface="Times New Roman" panose="02020603050405020304" pitchFamily="18" charset="0"/>
-              </a:rPr>
-              <a:t>eixos ficam invertidos </a:t>
-            </a:r>
-            <a:r>
-              <a:rPr lang="pt-BR" dirty="0">
-                <a:solidFill>
-                  <a:schemeClr val="tx1"/>
-                </a:solidFill>
-                <a:latin typeface="Times New Roman" panose="02020603050405020304" pitchFamily="18" charset="0"/>
-                <a:cs typeface="Times New Roman" panose="02020603050405020304" pitchFamily="18" charset="0"/>
-              </a:rPr>
-              <a:t>em comparação ao </a:t>
-            </a:r>
-            <a:r>
-              <a:rPr lang="pt-BR" b="1" dirty="0" err="1">
-                <a:solidFill>
-                  <a:schemeClr val="tx1"/>
                 </a:solidFill>
                 <a:latin typeface="Times New Roman" panose="02020603050405020304" pitchFamily="18" charset="0"/>
                 <a:cs typeface="Times New Roman" panose="02020603050405020304" pitchFamily="18" charset="0"/>
@@ -10676,7 +10736,7 @@
             <a:r>
               <a:rPr lang="pt-BR" b="1" dirty="0" err="1">
                 <a:solidFill>
-                  <a:schemeClr val="tx1"/>
+                  <a:srgbClr val="FF0000"/>
                 </a:solidFill>
                 <a:latin typeface="Times New Roman" panose="02020603050405020304" pitchFamily="18" charset="0"/>
                 <a:cs typeface="Times New Roman" panose="02020603050405020304" pitchFamily="18" charset="0"/>
@@ -10716,12 +10776,22 @@
             <a:r>
               <a:rPr lang="pt-BR" b="1" dirty="0">
                 <a:solidFill>
-                  <a:schemeClr val="tx1"/>
-                </a:solidFill>
-                <a:latin typeface="Times New Roman" panose="02020603050405020304" pitchFamily="18" charset="0"/>
-                <a:cs typeface="Times New Roman" panose="02020603050405020304" pitchFamily="18" charset="0"/>
-              </a:rPr>
-              <a:t>display: </a:t>
+                  <a:srgbClr val="FF0000"/>
+                </a:solidFill>
+                <a:latin typeface="Times New Roman" panose="02020603050405020304" pitchFamily="18" charset="0"/>
+                <a:cs typeface="Times New Roman" panose="02020603050405020304" pitchFamily="18" charset="0"/>
+              </a:rPr>
+              <a:t>display</a:t>
+            </a:r>
+            <a:r>
+              <a:rPr lang="pt-BR" b="1" dirty="0">
+                <a:solidFill>
+                  <a:schemeClr val="tx1"/>
+                </a:solidFill>
+                <a:latin typeface="Times New Roman" panose="02020603050405020304" pitchFamily="18" charset="0"/>
+                <a:cs typeface="Times New Roman" panose="02020603050405020304" pitchFamily="18" charset="0"/>
+              </a:rPr>
+              <a:t>: </a:t>
             </a:r>
             <a:r>
               <a:rPr lang="pt-BR" b="1" dirty="0" err="1">
@@ -10791,7 +10861,17 @@
                 <a:latin typeface="Times New Roman" panose="02020603050405020304" pitchFamily="18" charset="0"/>
                 <a:cs typeface="Times New Roman" panose="02020603050405020304" pitchFamily="18" charset="0"/>
               </a:rPr>
-              <a:t> como padrão</a:t>
+              <a:t> </a:t>
+            </a:r>
+            <a:r>
+              <a:rPr lang="pt-BR" b="1" dirty="0">
+                <a:solidFill>
+                  <a:schemeClr val="tx1"/>
+                </a:solidFill>
+                <a:latin typeface="Times New Roman" panose="02020603050405020304" pitchFamily="18" charset="0"/>
+                <a:cs typeface="Times New Roman" panose="02020603050405020304" pitchFamily="18" charset="0"/>
+              </a:rPr>
+              <a:t>como padrão</a:t>
             </a:r>
             <a:r>
               <a:rPr lang="pt-BR" dirty="0">
@@ -11528,7 +11608,7 @@
             <a:r>
               <a:rPr lang="pt-BR" b="1" dirty="0" err="1">
                 <a:solidFill>
-                  <a:schemeClr val="tx1"/>
+                  <a:srgbClr val="FF0000"/>
                 </a:solidFill>
                 <a:latin typeface="Times New Roman" panose="02020603050405020304" pitchFamily="18" charset="0"/>
                 <a:cs typeface="Times New Roman" panose="02020603050405020304" pitchFamily="18" charset="0"/>
@@ -12359,7 +12439,7 @@
                 <a:latin typeface="Times New Roman" panose="02020603050405020304" pitchFamily="18" charset="0"/>
                 <a:cs typeface="Times New Roman" panose="02020603050405020304" pitchFamily="18" charset="0"/>
               </a:rPr>
-              <a:t>Safari e o Google Chrome </a:t>
+              <a:t>Safari </a:t>
             </a:r>
             <a:r>
               <a:rPr lang="pt-BR" sz="2400" dirty="0">
@@ -12369,7 +12449,7 @@
                 <a:latin typeface="Times New Roman" panose="02020603050405020304" pitchFamily="18" charset="0"/>
                 <a:cs typeface="Times New Roman" panose="02020603050405020304" pitchFamily="18" charset="0"/>
               </a:rPr>
-              <a:t>utilizam o motor </a:t>
+              <a:t>utiliza o motor de renderização o </a:t>
             </a:r>
             <a:r>
               <a:rPr lang="pt-BR" sz="2400" b="1" dirty="0" err="1">
@@ -12382,6 +12462,46 @@
               <a:t>webkit</a:t>
             </a:r>
             <a:r>
+              <a:rPr lang="pt-BR" sz="2400" b="1" dirty="0">
+                <a:solidFill>
+                  <a:schemeClr val="tx1"/>
+                </a:solidFill>
+                <a:latin typeface="Times New Roman" panose="02020603050405020304" pitchFamily="18" charset="0"/>
+                <a:cs typeface="Times New Roman" panose="02020603050405020304" pitchFamily="18" charset="0"/>
+              </a:rPr>
+              <a:t>,</a:t>
+            </a:r>
+            <a:r>
+              <a:rPr lang="pt-BR" sz="2400" b="1" dirty="0">
+                <a:solidFill>
+                  <a:srgbClr val="FF0000"/>
+                </a:solidFill>
+                <a:latin typeface="Times New Roman" panose="02020603050405020304" pitchFamily="18" charset="0"/>
+                <a:cs typeface="Times New Roman" panose="02020603050405020304" pitchFamily="18" charset="0"/>
+              </a:rPr>
+              <a:t> </a:t>
+            </a:r>
+            <a:r>
+              <a:rPr lang="pt-BR" sz="2400" b="1" dirty="0">
+                <a:solidFill>
+                  <a:schemeClr val="tx1"/>
+                </a:solidFill>
+                <a:latin typeface="Times New Roman" panose="02020603050405020304" pitchFamily="18" charset="0"/>
+                <a:cs typeface="Times New Roman" panose="02020603050405020304" pitchFamily="18" charset="0"/>
+              </a:rPr>
+              <a:t>o Google Chrome e o Opera, </a:t>
+            </a:r>
+            <a:r>
+              <a:rPr lang="pt-BR" sz="2400" b="1" dirty="0" err="1">
+                <a:solidFill>
+                  <a:srgbClr val="FF0000"/>
+                </a:solidFill>
+                <a:latin typeface="Times New Roman" panose="02020603050405020304" pitchFamily="18" charset="0"/>
+                <a:cs typeface="Times New Roman" panose="02020603050405020304" pitchFamily="18" charset="0"/>
+              </a:rPr>
+              <a:t>Blink</a:t>
+            </a:r>
+            <a:r>
               <a:rPr lang="pt-BR" sz="2400" dirty="0">
                 <a:solidFill>
                   <a:schemeClr val="tx1"/>
@@ -12409,7 +12529,7 @@
                 <a:latin typeface="Times New Roman" panose="02020603050405020304" pitchFamily="18" charset="0"/>
                 <a:cs typeface="Times New Roman" panose="02020603050405020304" pitchFamily="18" charset="0"/>
               </a:rPr>
-              <a:t> Firefox </a:t>
+              <a:t> Firefox, </a:t>
             </a:r>
             <a:r>
               <a:rPr lang="pt-BR" sz="2400" dirty="0">
@@ -12419,17 +12539,37 @@
                 <a:latin typeface="Times New Roman" panose="02020603050405020304" pitchFamily="18" charset="0"/>
                 <a:cs typeface="Times New Roman" panose="02020603050405020304" pitchFamily="18" charset="0"/>
               </a:rPr>
-              <a:t>utiliza o prefixo </a:t>
+              <a:t>prefixo </a:t>
             </a:r>
             <a:r>
               <a:rPr lang="pt-BR" sz="2400" b="1" dirty="0" err="1">
                 <a:solidFill>
+                  <a:schemeClr val="tx1"/>
+                </a:solidFill>
+                <a:latin typeface="Times New Roman" panose="02020603050405020304" pitchFamily="18" charset="0"/>
+                <a:cs typeface="Times New Roman" panose="02020603050405020304" pitchFamily="18" charset="0"/>
+              </a:rPr>
+              <a:t>moz</a:t>
+            </a:r>
+            <a:r>
+              <a:rPr lang="pt-BR" sz="2400" b="1" dirty="0">
+                <a:solidFill>
                   <a:srgbClr val="FF0000"/>
                 </a:solidFill>
                 <a:latin typeface="Times New Roman" panose="02020603050405020304" pitchFamily="18" charset="0"/>
                 <a:cs typeface="Times New Roman" panose="02020603050405020304" pitchFamily="18" charset="0"/>
               </a:rPr>
-              <a:t>moz</a:t>
+              <a:t>, </a:t>
+            </a:r>
+            <a:r>
+              <a:rPr lang="pt-BR" sz="2400" b="1" dirty="0" err="1">
+                <a:solidFill>
+                  <a:srgbClr val="FF0000"/>
+                </a:solidFill>
+                <a:latin typeface="Times New Roman" panose="02020603050405020304" pitchFamily="18" charset="0"/>
+                <a:cs typeface="Times New Roman" panose="02020603050405020304" pitchFamily="18" charset="0"/>
+              </a:rPr>
+              <a:t>Gecko</a:t>
             </a:r>
             <a:r>
               <a:rPr lang="pt-BR" sz="2400" dirty="0">
@@ -12439,7 +12579,157 @@
                 <a:latin typeface="Times New Roman" panose="02020603050405020304" pitchFamily="18" charset="0"/>
                 <a:cs typeface="Times New Roman" panose="02020603050405020304" pitchFamily="18" charset="0"/>
               </a:rPr>
-              <a:t> para referenciar seu motor de renderização. </a:t>
+              <a:t>, </a:t>
+            </a:r>
+            <a:r>
+              <a:rPr lang="pt-BR" sz="2400" b="1" dirty="0">
+                <a:solidFill>
+                  <a:schemeClr val="tx1"/>
+                </a:solidFill>
+                <a:latin typeface="Times New Roman" panose="02020603050405020304" pitchFamily="18" charset="0"/>
+                <a:cs typeface="Times New Roman" panose="02020603050405020304" pitchFamily="18" charset="0"/>
+              </a:rPr>
+              <a:t>Edge, </a:t>
+            </a:r>
+            <a:r>
+              <a:rPr lang="pt-BR" sz="2400" b="1" dirty="0" err="1">
+                <a:solidFill>
+                  <a:srgbClr val="FF0000"/>
+                </a:solidFill>
+                <a:latin typeface="Times New Roman" panose="02020603050405020304" pitchFamily="18" charset="0"/>
+                <a:cs typeface="Times New Roman" panose="02020603050405020304" pitchFamily="18" charset="0"/>
+              </a:rPr>
+              <a:t>EdgeHTML</a:t>
+            </a:r>
+            <a:r>
+              <a:rPr lang="pt-BR" sz="2400" b="1" dirty="0">
+                <a:solidFill>
+                  <a:schemeClr val="tx1"/>
+                </a:solidFill>
+                <a:latin typeface="Times New Roman" panose="02020603050405020304" pitchFamily="18" charset="0"/>
+                <a:cs typeface="Times New Roman" panose="02020603050405020304" pitchFamily="18" charset="0"/>
+              </a:rPr>
+              <a:t>(</a:t>
+            </a:r>
+            <a:r>
+              <a:rPr lang="pt-BR" sz="2400" b="1" dirty="0" err="1">
+                <a:solidFill>
+                  <a:schemeClr val="tx1"/>
+                </a:solidFill>
+                <a:latin typeface="Times New Roman" panose="02020603050405020304" pitchFamily="18" charset="0"/>
+                <a:cs typeface="Times New Roman" panose="02020603050405020304" pitchFamily="18" charset="0"/>
+              </a:rPr>
+              <a:t>fork</a:t>
+            </a:r>
+            <a:r>
+              <a:rPr lang="pt-BR" sz="2400" b="1" dirty="0">
+                <a:solidFill>
+                  <a:schemeClr val="tx1"/>
+                </a:solidFill>
+                <a:latin typeface="Times New Roman" panose="02020603050405020304" pitchFamily="18" charset="0"/>
+                <a:cs typeface="Times New Roman" panose="02020603050405020304" pitchFamily="18" charset="0"/>
+              </a:rPr>
+              <a:t> </a:t>
+            </a:r>
+            <a:r>
+              <a:rPr lang="pt-BR" sz="2400" b="1" dirty="0">
+                <a:solidFill>
+                  <a:srgbClr val="FF0000"/>
+                </a:solidFill>
+                <a:latin typeface="Times New Roman" panose="02020603050405020304" pitchFamily="18" charset="0"/>
+                <a:cs typeface="Times New Roman" panose="02020603050405020304" pitchFamily="18" charset="0"/>
+              </a:rPr>
+              <a:t>Trident</a:t>
+            </a:r>
+            <a:r>
+              <a:rPr lang="pt-BR" sz="2400" b="1" dirty="0">
+                <a:solidFill>
+                  <a:schemeClr val="tx1"/>
+                </a:solidFill>
+                <a:latin typeface="Times New Roman" panose="02020603050405020304" pitchFamily="18" charset="0"/>
+                <a:cs typeface="Times New Roman" panose="02020603050405020304" pitchFamily="18" charset="0"/>
+              </a:rPr>
+              <a:t>)</a:t>
+            </a:r>
+            <a:r>
+              <a:rPr lang="pt-BR" sz="2400" dirty="0">
+                <a:solidFill>
+                  <a:schemeClr val="tx1"/>
+                </a:solidFill>
+                <a:latin typeface="Times New Roman" panose="02020603050405020304" pitchFamily="18" charset="0"/>
+                <a:cs typeface="Times New Roman" panose="02020603050405020304" pitchFamily="18" charset="0"/>
+              </a:rPr>
+              <a:t>, o </a:t>
+            </a:r>
+            <a:r>
+              <a:rPr lang="pt-BR" sz="2400" b="1" dirty="0">
+                <a:solidFill>
+                  <a:schemeClr val="tx1"/>
+                </a:solidFill>
+                <a:latin typeface="Times New Roman" panose="02020603050405020304" pitchFamily="18" charset="0"/>
+                <a:cs typeface="Times New Roman" panose="02020603050405020304" pitchFamily="18" charset="0"/>
+              </a:rPr>
+              <a:t>Opera mini</a:t>
+            </a:r>
+            <a:r>
+              <a:rPr lang="pt-BR" sz="2400" dirty="0">
+                <a:solidFill>
+                  <a:schemeClr val="tx1"/>
+                </a:solidFill>
+                <a:latin typeface="Times New Roman" panose="02020603050405020304" pitchFamily="18" charset="0"/>
+                <a:cs typeface="Times New Roman" panose="02020603050405020304" pitchFamily="18" charset="0"/>
+              </a:rPr>
+              <a:t> e </a:t>
+            </a:r>
+            <a:r>
+              <a:rPr lang="pt-BR" sz="2400" b="1" dirty="0">
+                <a:solidFill>
+                  <a:schemeClr val="tx1"/>
+                </a:solidFill>
+                <a:latin typeface="Times New Roman" panose="02020603050405020304" pitchFamily="18" charset="0"/>
+                <a:cs typeface="Times New Roman" panose="02020603050405020304" pitchFamily="18" charset="0"/>
+              </a:rPr>
+              <a:t>Opera Classic</a:t>
+            </a:r>
+            <a:r>
+              <a:rPr lang="pt-BR" sz="2400" dirty="0">
+                <a:solidFill>
+                  <a:schemeClr val="tx1"/>
+                </a:solidFill>
+                <a:latin typeface="Times New Roman" panose="02020603050405020304" pitchFamily="18" charset="0"/>
+                <a:cs typeface="Times New Roman" panose="02020603050405020304" pitchFamily="18" charset="0"/>
+              </a:rPr>
+              <a:t>,</a:t>
+            </a:r>
+            <a:r>
+              <a:rPr lang="pt-BR" sz="2400" b="1" dirty="0">
+                <a:solidFill>
+                  <a:schemeClr val="tx1"/>
+                </a:solidFill>
+                <a:latin typeface="Times New Roman" panose="02020603050405020304" pitchFamily="18" charset="0"/>
+                <a:cs typeface="Times New Roman" panose="02020603050405020304" pitchFamily="18" charset="0"/>
+              </a:rPr>
+              <a:t> </a:t>
+            </a:r>
+            <a:r>
+              <a:rPr lang="pt-BR" sz="2400" b="1" dirty="0">
+                <a:solidFill>
+                  <a:srgbClr val="FF0000"/>
+                </a:solidFill>
+                <a:latin typeface="Times New Roman" panose="02020603050405020304" pitchFamily="18" charset="0"/>
+                <a:cs typeface="Times New Roman" panose="02020603050405020304" pitchFamily="18" charset="0"/>
+              </a:rPr>
+              <a:t>Presto</a:t>
+            </a:r>
+            <a:r>
+              <a:rPr lang="pt-BR" sz="2400" dirty="0">
+                <a:solidFill>
+                  <a:schemeClr val="tx1"/>
+                </a:solidFill>
+                <a:latin typeface="Times New Roman" panose="02020603050405020304" pitchFamily="18" charset="0"/>
+                <a:cs typeface="Times New Roman" panose="02020603050405020304" pitchFamily="18" charset="0"/>
+              </a:rPr>
+              <a:t>. </a:t>
             </a:r>
           </a:p>
           <a:p>
@@ -12466,17 +12756,17 @@
                 <a:latin typeface="Times New Roman" panose="02020603050405020304" pitchFamily="18" charset="0"/>
                 <a:cs typeface="Times New Roman" panose="02020603050405020304" pitchFamily="18" charset="0"/>
               </a:rPr>
-              <a:t>Também temos os prefixos </a:t>
+              <a:t>O </a:t>
             </a:r>
             <a:r>
               <a:rPr lang="pt-BR" sz="2400" b="1" dirty="0">
                 <a:solidFill>
-                  <a:srgbClr val="FF0000"/>
-                </a:solidFill>
-                <a:latin typeface="Times New Roman" panose="02020603050405020304" pitchFamily="18" charset="0"/>
-                <a:cs typeface="Times New Roman" panose="02020603050405020304" pitchFamily="18" charset="0"/>
-              </a:rPr>
-              <a:t>O</a:t>
+                  <a:schemeClr val="tx1"/>
+                </a:solidFill>
+                <a:latin typeface="Times New Roman" panose="02020603050405020304" pitchFamily="18" charset="0"/>
+                <a:cs typeface="Times New Roman" panose="02020603050405020304" pitchFamily="18" charset="0"/>
+              </a:rPr>
+              <a:t>Internet Explorer </a:t>
             </a:r>
             <a:r>
               <a:rPr lang="pt-BR" sz="2400" dirty="0">
@@ -12486,7 +12776,7 @@
                 <a:latin typeface="Times New Roman" panose="02020603050405020304" pitchFamily="18" charset="0"/>
                 <a:cs typeface="Times New Roman" panose="02020603050405020304" pitchFamily="18" charset="0"/>
               </a:rPr>
-              <a:t>, que remete ao navegador </a:t>
+              <a:t>da Microsoft, utiliza o </a:t>
             </a:r>
             <a:r>
               <a:rPr lang="pt-BR" sz="2400" b="1" dirty="0">
@@ -12496,47 +12786,7 @@
                 <a:latin typeface="Times New Roman" panose="02020603050405020304" pitchFamily="18" charset="0"/>
                 <a:cs typeface="Times New Roman" panose="02020603050405020304" pitchFamily="18" charset="0"/>
               </a:rPr>
-              <a:t>Opera</a:t>
-            </a:r>
-            <a:r>
-              <a:rPr lang="pt-BR" sz="2400" dirty="0">
-                <a:solidFill>
-                  <a:schemeClr val="tx1"/>
-                </a:solidFill>
-                <a:latin typeface="Times New Roman" panose="02020603050405020304" pitchFamily="18" charset="0"/>
-                <a:cs typeface="Times New Roman" panose="02020603050405020304" pitchFamily="18" charset="0"/>
-              </a:rPr>
-              <a:t>, e </a:t>
-            </a:r>
-            <a:r>
-              <a:rPr lang="pt-BR" sz="2400" b="1" dirty="0">
-                <a:solidFill>
-                  <a:srgbClr val="FF0000"/>
-                </a:solidFill>
-                <a:latin typeface="Times New Roman" panose="02020603050405020304" pitchFamily="18" charset="0"/>
-                <a:cs typeface="Times New Roman" panose="02020603050405020304" pitchFamily="18" charset="0"/>
-              </a:rPr>
-              <a:t>MS</a:t>
-            </a:r>
-            <a:r>
-              <a:rPr lang="pt-BR" sz="2400" dirty="0">
-                <a:solidFill>
-                  <a:schemeClr val="tx1"/>
-                </a:solidFill>
-                <a:latin typeface="Times New Roman" panose="02020603050405020304" pitchFamily="18" charset="0"/>
-                <a:cs typeface="Times New Roman" panose="02020603050405020304" pitchFamily="18" charset="0"/>
-              </a:rPr>
-              <a:t>, que remete ao </a:t>
-            </a:r>
-            <a:r>
-              <a:rPr lang="pt-BR" sz="2400" b="1" dirty="0">
-                <a:solidFill>
-                  <a:schemeClr val="tx1"/>
-                </a:solidFill>
-                <a:latin typeface="Times New Roman" panose="02020603050405020304" pitchFamily="18" charset="0"/>
-                <a:cs typeface="Times New Roman" panose="02020603050405020304" pitchFamily="18" charset="0"/>
-              </a:rPr>
-              <a:t>Internet Explorer</a:t>
+              <a:t>Trident</a:t>
             </a:r>
             <a:r>
               <a:rPr lang="pt-BR" sz="2400" dirty="0">

</xml_diff>